<commit_message>
Update Machine Learning in the Clinical Laboratory.pptx
</commit_message>
<xml_diff>
--- a/extras/Machine Learning in the Clinical Laboratory.pptx
+++ b/extras/Machine Learning in the Clinical Laboratory.pptx
@@ -110,6 +110,11 @@
       </a:defRPr>
     </a:lvl9pPr>
   </p:defaultTextStyle>
+  <p:extLst>
+    <p:ext uri="{EFAFB233-063F-42B5-8137-9DF3F51BA10A}">
+      <p15:sldGuideLst xmlns:p15="http://schemas.microsoft.com/office/powerpoint/2012/main"/>
+    </p:ext>
+  </p:extLst>
 </p:presentation>
 </file>
 
@@ -5492,7 +5497,7 @@
           <a:p>
             <a:fld id="{614920F4-076A-454E-9C92-D1BBA0E99FBE}" type="datetimeFigureOut">
               <a:rPr lang="en-US" smtClean="0"/>
-              <a:t>9/17/2022</a:t>
+              <a:t>9/19/2022</a:t>
             </a:fld>
             <a:endParaRPr lang="en-US"/>
           </a:p>
@@ -5690,7 +5695,7 @@
           <a:p>
             <a:fld id="{614920F4-076A-454E-9C92-D1BBA0E99FBE}" type="datetimeFigureOut">
               <a:rPr lang="en-US" smtClean="0"/>
-              <a:t>9/17/2022</a:t>
+              <a:t>9/19/2022</a:t>
             </a:fld>
             <a:endParaRPr lang="en-US"/>
           </a:p>
@@ -5898,7 +5903,7 @@
           <a:p>
             <a:fld id="{614920F4-076A-454E-9C92-D1BBA0E99FBE}" type="datetimeFigureOut">
               <a:rPr lang="en-US" smtClean="0"/>
-              <a:t>9/17/2022</a:t>
+              <a:t>9/19/2022</a:t>
             </a:fld>
             <a:endParaRPr lang="en-US"/>
           </a:p>
@@ -6096,7 +6101,7 @@
           <a:p>
             <a:fld id="{614920F4-076A-454E-9C92-D1BBA0E99FBE}" type="datetimeFigureOut">
               <a:rPr lang="en-US" smtClean="0"/>
-              <a:t>9/17/2022</a:t>
+              <a:t>9/19/2022</a:t>
             </a:fld>
             <a:endParaRPr lang="en-US"/>
           </a:p>
@@ -6371,7 +6376,7 @@
           <a:p>
             <a:fld id="{614920F4-076A-454E-9C92-D1BBA0E99FBE}" type="datetimeFigureOut">
               <a:rPr lang="en-US" smtClean="0"/>
-              <a:t>9/17/2022</a:t>
+              <a:t>9/19/2022</a:t>
             </a:fld>
             <a:endParaRPr lang="en-US"/>
           </a:p>
@@ -6636,7 +6641,7 @@
           <a:p>
             <a:fld id="{614920F4-076A-454E-9C92-D1BBA0E99FBE}" type="datetimeFigureOut">
               <a:rPr lang="en-US" smtClean="0"/>
-              <a:t>9/17/2022</a:t>
+              <a:t>9/19/2022</a:t>
             </a:fld>
             <a:endParaRPr lang="en-US"/>
           </a:p>
@@ -7048,7 +7053,7 @@
           <a:p>
             <a:fld id="{614920F4-076A-454E-9C92-D1BBA0E99FBE}" type="datetimeFigureOut">
               <a:rPr lang="en-US" smtClean="0"/>
-              <a:t>9/17/2022</a:t>
+              <a:t>9/19/2022</a:t>
             </a:fld>
             <a:endParaRPr lang="en-US"/>
           </a:p>
@@ -7189,7 +7194,7 @@
           <a:p>
             <a:fld id="{614920F4-076A-454E-9C92-D1BBA0E99FBE}" type="datetimeFigureOut">
               <a:rPr lang="en-US" smtClean="0"/>
-              <a:t>9/17/2022</a:t>
+              <a:t>9/19/2022</a:t>
             </a:fld>
             <a:endParaRPr lang="en-US"/>
           </a:p>
@@ -7302,7 +7307,7 @@
           <a:p>
             <a:fld id="{614920F4-076A-454E-9C92-D1BBA0E99FBE}" type="datetimeFigureOut">
               <a:rPr lang="en-US" smtClean="0"/>
-              <a:t>9/17/2022</a:t>
+              <a:t>9/19/2022</a:t>
             </a:fld>
             <a:endParaRPr lang="en-US"/>
           </a:p>
@@ -7613,7 +7618,7 @@
           <a:p>
             <a:fld id="{614920F4-076A-454E-9C92-D1BBA0E99FBE}" type="datetimeFigureOut">
               <a:rPr lang="en-US" smtClean="0"/>
-              <a:t>9/17/2022</a:t>
+              <a:t>9/19/2022</a:t>
             </a:fld>
             <a:endParaRPr lang="en-US"/>
           </a:p>
@@ -7901,7 +7906,7 @@
           <a:p>
             <a:fld id="{614920F4-076A-454E-9C92-D1BBA0E99FBE}" type="datetimeFigureOut">
               <a:rPr lang="en-US" smtClean="0"/>
-              <a:t>9/17/2022</a:t>
+              <a:t>9/19/2022</a:t>
             </a:fld>
             <a:endParaRPr lang="en-US"/>
           </a:p>
@@ -8142,7 +8147,7 @@
           <a:p>
             <a:fld id="{614920F4-076A-454E-9C92-D1BBA0E99FBE}" type="datetimeFigureOut">
               <a:rPr lang="en-US" smtClean="0"/>
-              <a:t>9/17/2022</a:t>
+              <a:t>9/19/2022</a:t>
             </a:fld>
             <a:endParaRPr lang="en-US"/>
           </a:p>
@@ -17814,12 +17819,12 @@
           <a:p>
             <a:pPr algn="ctr"/>
             <a:r>
-              <a:rPr lang="en-US" sz="3600">
+              <a:rPr lang="en-US" sz="3600" dirty="0">
                 <a:solidFill>
                   <a:schemeClr val="tx2"/>
                 </a:solidFill>
               </a:rPr>
-              <a:t>Research Question</a:t>
+              <a:t>Research Statement</a:t>
             </a:r>
           </a:p>
         </p:txBody>
@@ -22463,7 +22468,7 @@
           <a:lstStyle/>
           <a:p>
             <a:r>
-              <a:rPr lang="en-US" sz="2000">
+              <a:rPr lang="en-US" sz="2000" dirty="0">
                 <a:solidFill>
                   <a:schemeClr val="tx2"/>
                 </a:solidFill>
@@ -22472,7 +22477,7 @@
             </a:r>
           </a:p>
           <a:p>
-            <a:endParaRPr lang="en-US" sz="2000">
+            <a:endParaRPr lang="en-US" sz="2000" dirty="0">
               <a:solidFill>
                 <a:schemeClr val="tx2"/>
               </a:solidFill>

</xml_diff>